<commit_message>
add an example of persona-sheet.
</commit_message>
<xml_diff>
--- a/2014-12-24/persona-design.pptx
+++ b/2014-12-24/persona-design.pptx
@@ -7,6 +7,7 @@
   <p:sldIdLst>
     <p:sldId id="256" r:id="rId2"/>
     <p:sldId id="257" r:id="rId3"/>
+    <p:sldId id="258" r:id="rId4"/>
   </p:sldIdLst>
   <p:sldSz cx="6858000" cy="9144000" type="screen4x3"/>
   <p:notesSz cx="6858000" cy="9144000"/>
@@ -4149,6 +4150,1050 @@
     <p:extLst>
       <p:ext uri="{BB962C8B-B14F-4D97-AF65-F5344CB8AC3E}">
         <p14:creationId xmlns:p14="http://schemas.microsoft.com/office/powerpoint/2010/main" val="3966489063"/>
+      </p:ext>
+    </p:extLst>
+  </p:cSld>
+  <p:clrMapOvr>
+    <a:masterClrMapping/>
+  </p:clrMapOvr>
+  <p:timing>
+    <p:tnLst>
+      <p:par>
+        <p:cTn xmlns:p14="http://schemas.microsoft.com/office/powerpoint/2010/main" id="1" dur="indefinite" restart="never" nodeType="tmRoot"/>
+      </p:par>
+    </p:tnLst>
+  </p:timing>
+</p:sld>
+</file>
+
+<file path=ppt/slides/slide3.xml><?xml version="1.0" encoding="utf-8"?>
+<p:sld xmlns:a="http://schemas.openxmlformats.org/drawingml/2006/main" xmlns:r="http://schemas.openxmlformats.org/officeDocument/2006/relationships" xmlns:p="http://schemas.openxmlformats.org/presentationml/2006/main">
+  <p:cSld>
+    <p:spTree>
+      <p:nvGrpSpPr>
+        <p:cNvPr id="1" name=""/>
+        <p:cNvGrpSpPr/>
+        <p:nvPr/>
+      </p:nvGrpSpPr>
+      <p:grpSpPr>
+        <a:xfrm>
+          <a:off x="0" y="0"/>
+          <a:ext cx="0" cy="0"/>
+          <a:chOff x="0" y="0"/>
+          <a:chExt cx="0" cy="0"/>
+        </a:xfrm>
+      </p:grpSpPr>
+      <p:sp>
+        <p:nvSpPr>
+          <p:cNvPr id="2" name="正方形/長方形 1"/>
+          <p:cNvSpPr/>
+          <p:nvPr/>
+        </p:nvSpPr>
+        <p:spPr>
+          <a:xfrm>
+            <a:off x="278322" y="922011"/>
+            <a:ext cx="3131110" cy="3161984"/>
+          </a:xfrm>
+          <a:prstGeom prst="rect">
+            <a:avLst/>
+          </a:prstGeom>
+          <a:noFill/>
+          <a:ln>
+            <a:solidFill>
+              <a:schemeClr val="tx1"/>
+            </a:solidFill>
+          </a:ln>
+        </p:spPr>
+        <p:style>
+          <a:lnRef idx="1">
+            <a:schemeClr val="accent1"/>
+          </a:lnRef>
+          <a:fillRef idx="3">
+            <a:schemeClr val="accent1"/>
+          </a:fillRef>
+          <a:effectRef idx="2">
+            <a:schemeClr val="accent1"/>
+          </a:effectRef>
+          <a:fontRef idx="minor">
+            <a:schemeClr val="lt1"/>
+          </a:fontRef>
+        </p:style>
+        <p:txBody>
+          <a:bodyPr rtlCol="0" anchor="b" anchorCtr="1"/>
+          <a:lstStyle/>
+          <a:p>
+            <a:pPr algn="ctr"/>
+            <a:r>
+              <a:rPr kumimoji="1" lang="ja-JP" altLang="en-US" dirty="0" smtClean="0">
+                <a:solidFill>
+                  <a:schemeClr val="tx1"/>
+                </a:solidFill>
+              </a:rPr>
+              <a:t>　　　　　　　　　　　　</a:t>
+            </a:r>
+            <a:r>
+              <a:rPr kumimoji="1" lang="en-US" altLang="ja-JP" dirty="0" smtClean="0">
+                <a:solidFill>
+                  <a:schemeClr val="tx1"/>
+                </a:solidFill>
+              </a:rPr>
+              <a:t>[ </a:t>
+            </a:r>
+            <a:r>
+              <a:rPr kumimoji="1" lang="ja-JP" altLang="en-US" sz="1400" dirty="0" smtClean="0">
+                <a:solidFill>
+                  <a:schemeClr val="tx1"/>
+                </a:solidFill>
+              </a:rPr>
+              <a:t>似顔絵</a:t>
+            </a:r>
+            <a:r>
+              <a:rPr kumimoji="1" lang="en-US" altLang="ja-JP" sz="1400" dirty="0" smtClean="0">
+                <a:solidFill>
+                  <a:schemeClr val="tx1"/>
+                </a:solidFill>
+              </a:rPr>
+              <a:t> ]</a:t>
+            </a:r>
+            <a:endParaRPr kumimoji="1" lang="ja-JP" altLang="en-US" sz="1400" dirty="0">
+              <a:solidFill>
+                <a:schemeClr val="tx1"/>
+              </a:solidFill>
+            </a:endParaRPr>
+          </a:p>
+        </p:txBody>
+      </p:sp>
+      <p:sp>
+        <p:nvSpPr>
+          <p:cNvPr id="3" name="テキスト ボックス 2"/>
+          <p:cNvSpPr txBox="1"/>
+          <p:nvPr/>
+        </p:nvSpPr>
+        <p:spPr>
+          <a:xfrm>
+            <a:off x="469666" y="330533"/>
+            <a:ext cx="5392467" cy="369332"/>
+          </a:xfrm>
+          <a:prstGeom prst="rect">
+            <a:avLst/>
+          </a:prstGeom>
+          <a:noFill/>
+        </p:spPr>
+        <p:txBody>
+          <a:bodyPr wrap="square" rtlCol="0">
+            <a:spAutoFit/>
+          </a:bodyPr>
+          <a:lstStyle/>
+          <a:p>
+            <a:r>
+              <a:rPr lang="ja-JP" altLang="en-US" u="sng" dirty="0" smtClean="0"/>
+              <a:t>タイトル</a:t>
+            </a:r>
+            <a:r>
+              <a:rPr lang="en-US" altLang="ja-JP" u="sng" dirty="0" smtClean="0"/>
+              <a:t>or</a:t>
+            </a:r>
+            <a:r>
+              <a:rPr lang="ja-JP" altLang="en-US" u="sng" dirty="0" smtClean="0"/>
+              <a:t>タグ＋氏名：　</a:t>
+            </a:r>
+            <a:r>
+              <a:rPr lang="ja-JP" altLang="en-US" sz="1000" i="1" u="sng" dirty="0" smtClean="0">
+                <a:latin typeface="Osaka"/>
+                <a:ea typeface="Osaka"/>
+                <a:cs typeface="Osaka"/>
+              </a:rPr>
+              <a:t>学科カリキュラムの在り様で悩んでいる教員なるとま</a:t>
+            </a:r>
+            <a:r>
+              <a:rPr lang="ja-JP" altLang="en-US" u="sng" dirty="0" smtClean="0"/>
+              <a:t>　　</a:t>
+            </a:r>
+            <a:endParaRPr kumimoji="1" lang="ja-JP" altLang="en-US" u="sng" dirty="0"/>
+          </a:p>
+        </p:txBody>
+      </p:sp>
+      <p:sp>
+        <p:nvSpPr>
+          <p:cNvPr id="5" name="正方形/長方形 4"/>
+          <p:cNvSpPr/>
+          <p:nvPr/>
+        </p:nvSpPr>
+        <p:spPr>
+          <a:xfrm>
+            <a:off x="3579226" y="922011"/>
+            <a:ext cx="2870184" cy="2574672"/>
+          </a:xfrm>
+          <a:prstGeom prst="rect">
+            <a:avLst/>
+          </a:prstGeom>
+          <a:noFill/>
+          <a:ln>
+            <a:noFill/>
+          </a:ln>
+          <a:effectLst/>
+        </p:spPr>
+        <p:style>
+          <a:lnRef idx="1">
+            <a:schemeClr val="accent1"/>
+          </a:lnRef>
+          <a:fillRef idx="3">
+            <a:schemeClr val="accent1"/>
+          </a:fillRef>
+          <a:effectRef idx="2">
+            <a:schemeClr val="accent1"/>
+          </a:effectRef>
+          <a:fontRef idx="minor">
+            <a:schemeClr val="lt1"/>
+          </a:fontRef>
+        </p:style>
+        <p:txBody>
+          <a:bodyPr rtlCol="0" anchor="t" anchorCtr="0"/>
+          <a:lstStyle/>
+          <a:p>
+            <a:r>
+              <a:rPr kumimoji="1" lang="en-US" altLang="ja-JP" b="1" dirty="0" smtClean="0">
+                <a:solidFill>
+                  <a:srgbClr val="000000"/>
+                </a:solidFill>
+              </a:rPr>
+              <a:t>[ </a:t>
+            </a:r>
+            <a:r>
+              <a:rPr kumimoji="1" lang="ja-JP" altLang="en-US" b="1" dirty="0" smtClean="0">
+                <a:solidFill>
+                  <a:srgbClr val="000000"/>
+                </a:solidFill>
+              </a:rPr>
+              <a:t>ユーザーストーリー</a:t>
+            </a:r>
+            <a:r>
+              <a:rPr kumimoji="1" lang="en-US" altLang="ja-JP" b="1" dirty="0" smtClean="0">
+                <a:solidFill>
+                  <a:srgbClr val="000000"/>
+                </a:solidFill>
+              </a:rPr>
+              <a:t> ]</a:t>
+            </a:r>
+          </a:p>
+          <a:p>
+            <a:endParaRPr lang="en-US" altLang="ja-JP" sz="1000" b="1" dirty="0">
+              <a:solidFill>
+                <a:srgbClr val="000000"/>
+              </a:solidFill>
+            </a:endParaRPr>
+          </a:p>
+          <a:p>
+            <a:r>
+              <a:rPr kumimoji="1" lang="ja-JP" altLang="en-US" sz="1000" b="1" i="1" dirty="0" smtClean="0">
+                <a:solidFill>
+                  <a:srgbClr val="000000"/>
+                </a:solidFill>
+                <a:latin typeface="Osaka"/>
+                <a:ea typeface="Osaka"/>
+                <a:cs typeface="Osaka"/>
+              </a:rPr>
+              <a:t>・学科カリキュラムは随時テコ入れされているが、そろそろ大幅な変更も含めた検討が必要か。</a:t>
+            </a:r>
+            <a:endParaRPr kumimoji="1" lang="en-US" altLang="ja-JP" sz="1000" b="1" i="1" dirty="0" smtClean="0">
+              <a:solidFill>
+                <a:srgbClr val="000000"/>
+              </a:solidFill>
+              <a:latin typeface="Osaka"/>
+              <a:ea typeface="Osaka"/>
+              <a:cs typeface="Osaka"/>
+            </a:endParaRPr>
+          </a:p>
+          <a:p>
+            <a:r>
+              <a:rPr lang="ja-JP" altLang="en-US" sz="1000" b="1" i="1" dirty="0" smtClean="0">
+                <a:solidFill>
+                  <a:srgbClr val="000000"/>
+                </a:solidFill>
+                <a:latin typeface="Osaka"/>
+                <a:ea typeface="Osaka"/>
+                <a:cs typeface="Osaka"/>
+              </a:rPr>
+              <a:t>・合同デザインスクールでしか得られない・学習機械を提供できないモノは何か。</a:t>
+            </a:r>
+            <a:endParaRPr lang="en-US" altLang="ja-JP" sz="1000" b="1" i="1" dirty="0" smtClean="0">
+              <a:solidFill>
+                <a:srgbClr val="000000"/>
+              </a:solidFill>
+              <a:latin typeface="Osaka"/>
+              <a:ea typeface="Osaka"/>
+              <a:cs typeface="Osaka"/>
+            </a:endParaRPr>
+          </a:p>
+          <a:p>
+            <a:r>
+              <a:rPr kumimoji="1" lang="ja-JP" altLang="en-US" sz="1000" b="1" i="1" dirty="0" smtClean="0">
+                <a:solidFill>
+                  <a:srgbClr val="000000"/>
+                </a:solidFill>
+                <a:latin typeface="Osaka"/>
+                <a:ea typeface="Osaka"/>
+                <a:cs typeface="Osaka"/>
+              </a:rPr>
+              <a:t>・教員として考えるものはあれこれあるが、ニーズ（学生／社会）に応えられることが大切な側面も少なくないだろう。</a:t>
+            </a:r>
+            <a:endParaRPr kumimoji="1" lang="en-US" altLang="ja-JP" sz="1000" b="1" i="1" dirty="0" smtClean="0">
+              <a:solidFill>
+                <a:srgbClr val="000000"/>
+              </a:solidFill>
+              <a:latin typeface="Osaka"/>
+              <a:ea typeface="Osaka"/>
+              <a:cs typeface="Osaka"/>
+            </a:endParaRPr>
+          </a:p>
+          <a:p>
+            <a:r>
+              <a:rPr lang="ja-JP" altLang="en-US" sz="1000" b="1" i="1" dirty="0" smtClean="0">
+                <a:solidFill>
+                  <a:srgbClr val="000000"/>
+                </a:solidFill>
+                <a:latin typeface="Osaka"/>
+                <a:ea typeface="Osaka"/>
+                <a:cs typeface="Osaka"/>
+              </a:rPr>
+              <a:t>・ただの専門学校ではなく大学として提供すべき科目・カリキュラムとは？</a:t>
+            </a:r>
+            <a:endParaRPr lang="en-US" altLang="ja-JP" sz="1000" b="1" i="1" dirty="0" smtClean="0">
+              <a:solidFill>
+                <a:srgbClr val="000000"/>
+              </a:solidFill>
+              <a:latin typeface="Osaka"/>
+              <a:ea typeface="Osaka"/>
+              <a:cs typeface="Osaka"/>
+            </a:endParaRPr>
+          </a:p>
+          <a:p>
+            <a:r>
+              <a:rPr kumimoji="1" lang="ja-JP" altLang="en-US" sz="1000" b="1" i="1" dirty="0" smtClean="0">
+                <a:solidFill>
+                  <a:srgbClr val="000000"/>
+                </a:solidFill>
+                <a:latin typeface="Osaka"/>
+                <a:ea typeface="Osaka"/>
+                <a:cs typeface="Osaka"/>
+              </a:rPr>
+              <a:t>・えっ、プログラミング！？心の準備と時間がッ</a:t>
+            </a:r>
+            <a:endParaRPr kumimoji="1" lang="ja-JP" altLang="en-US" sz="1000" b="1" i="1" dirty="0">
+              <a:solidFill>
+                <a:srgbClr val="000000"/>
+              </a:solidFill>
+              <a:latin typeface="Osaka"/>
+              <a:ea typeface="Osaka"/>
+              <a:cs typeface="Osaka"/>
+            </a:endParaRPr>
+          </a:p>
+        </p:txBody>
+      </p:sp>
+      <p:sp>
+        <p:nvSpPr>
+          <p:cNvPr id="6" name="正方形/長方形 5"/>
+          <p:cNvSpPr/>
+          <p:nvPr/>
+        </p:nvSpPr>
+        <p:spPr>
+          <a:xfrm>
+            <a:off x="278321" y="4571094"/>
+            <a:ext cx="2870184" cy="2934605"/>
+          </a:xfrm>
+          <a:prstGeom prst="rect">
+            <a:avLst/>
+          </a:prstGeom>
+          <a:noFill/>
+          <a:ln>
+            <a:noFill/>
+          </a:ln>
+          <a:effectLst/>
+        </p:spPr>
+        <p:style>
+          <a:lnRef idx="1">
+            <a:schemeClr val="accent1"/>
+          </a:lnRef>
+          <a:fillRef idx="3">
+            <a:schemeClr val="accent1"/>
+          </a:fillRef>
+          <a:effectRef idx="2">
+            <a:schemeClr val="accent1"/>
+          </a:effectRef>
+          <a:fontRef idx="minor">
+            <a:schemeClr val="lt1"/>
+          </a:fontRef>
+        </p:style>
+        <p:txBody>
+          <a:bodyPr rtlCol="0" anchor="t" anchorCtr="0"/>
+          <a:lstStyle/>
+          <a:p>
+            <a:r>
+              <a:rPr kumimoji="1" lang="en-US" altLang="ja-JP" b="1" dirty="0" smtClean="0">
+                <a:solidFill>
+                  <a:srgbClr val="000000"/>
+                </a:solidFill>
+              </a:rPr>
+              <a:t>[ </a:t>
+            </a:r>
+            <a:r>
+              <a:rPr kumimoji="1" lang="ja-JP" altLang="en-US" b="1" dirty="0" smtClean="0">
+                <a:solidFill>
+                  <a:srgbClr val="000000"/>
+                </a:solidFill>
+              </a:rPr>
+              <a:t>個人情報</a:t>
+            </a:r>
+            <a:r>
+              <a:rPr kumimoji="1" lang="en-US" altLang="ja-JP" b="1" dirty="0" smtClean="0">
+                <a:solidFill>
+                  <a:srgbClr val="000000"/>
+                </a:solidFill>
+              </a:rPr>
+              <a:t> ]</a:t>
+            </a:r>
+          </a:p>
+          <a:p>
+            <a:endParaRPr lang="en-US" altLang="ja-JP" sz="1200" dirty="0" smtClean="0">
+              <a:solidFill>
+                <a:srgbClr val="000000"/>
+              </a:solidFill>
+            </a:endParaRPr>
+          </a:p>
+          <a:p>
+            <a:r>
+              <a:rPr lang="ja-JP" altLang="en-US" sz="1200" dirty="0" smtClean="0">
+                <a:solidFill>
+                  <a:srgbClr val="000000"/>
+                </a:solidFill>
+              </a:rPr>
+              <a:t>・年齢：</a:t>
+            </a:r>
+            <a:r>
+              <a:rPr lang="en-US" altLang="ja-JP" sz="1200" i="1" dirty="0" smtClean="0">
+                <a:solidFill>
+                  <a:srgbClr val="000000"/>
+                </a:solidFill>
+                <a:latin typeface="Osaka"/>
+                <a:ea typeface="Osaka"/>
+                <a:cs typeface="Osaka"/>
+              </a:rPr>
+              <a:t>30</a:t>
+            </a:r>
+            <a:r>
+              <a:rPr lang="ja-JP" altLang="en-US" sz="1200" i="1" dirty="0" smtClean="0">
+                <a:solidFill>
+                  <a:srgbClr val="000000"/>
+                </a:solidFill>
+                <a:latin typeface="Osaka"/>
+                <a:ea typeface="Osaka"/>
+                <a:cs typeface="Osaka"/>
+              </a:rPr>
+              <a:t>代後半？</a:t>
+            </a:r>
+            <a:endParaRPr lang="en-US" altLang="ja-JP" sz="1200" i="1" dirty="0" smtClean="0">
+              <a:solidFill>
+                <a:srgbClr val="000000"/>
+              </a:solidFill>
+              <a:latin typeface="Osaka"/>
+              <a:ea typeface="Osaka"/>
+              <a:cs typeface="Osaka"/>
+            </a:endParaRPr>
+          </a:p>
+          <a:p>
+            <a:endParaRPr kumimoji="1" lang="en-US" altLang="ja-JP" sz="1200" dirty="0" smtClean="0">
+              <a:solidFill>
+                <a:srgbClr val="000000"/>
+              </a:solidFill>
+            </a:endParaRPr>
+          </a:p>
+          <a:p>
+            <a:r>
+              <a:rPr kumimoji="1" lang="ja-JP" altLang="en-US" sz="1200" dirty="0" smtClean="0">
+                <a:solidFill>
+                  <a:srgbClr val="000000"/>
+                </a:solidFill>
+              </a:rPr>
+              <a:t>・性別：</a:t>
+            </a:r>
+            <a:r>
+              <a:rPr kumimoji="1" lang="ja-JP" altLang="en-US" sz="1200" i="1" dirty="0" smtClean="0">
+                <a:solidFill>
+                  <a:srgbClr val="000000"/>
+                </a:solidFill>
+                <a:latin typeface="Osaka"/>
+                <a:ea typeface="Osaka"/>
+                <a:cs typeface="Osaka"/>
+              </a:rPr>
+              <a:t>男</a:t>
+            </a:r>
+            <a:endParaRPr kumimoji="1" lang="en-US" altLang="ja-JP" sz="1200" i="1" dirty="0" smtClean="0">
+              <a:solidFill>
+                <a:srgbClr val="000000"/>
+              </a:solidFill>
+              <a:latin typeface="Osaka"/>
+              <a:ea typeface="Osaka"/>
+              <a:cs typeface="Osaka"/>
+            </a:endParaRPr>
+          </a:p>
+          <a:p>
+            <a:endParaRPr lang="en-US" altLang="ja-JP" sz="1200" dirty="0" smtClean="0">
+              <a:solidFill>
+                <a:srgbClr val="000000"/>
+              </a:solidFill>
+            </a:endParaRPr>
+          </a:p>
+          <a:p>
+            <a:r>
+              <a:rPr lang="ja-JP" altLang="en-US" sz="1200" dirty="0" smtClean="0">
+                <a:solidFill>
+                  <a:srgbClr val="000000"/>
+                </a:solidFill>
+              </a:rPr>
+              <a:t>・業種：</a:t>
+            </a:r>
+            <a:r>
+              <a:rPr lang="ja-JP" altLang="en-US" sz="1200" i="1" dirty="0" smtClean="0">
+                <a:solidFill>
+                  <a:srgbClr val="000000"/>
+                </a:solidFill>
+                <a:latin typeface="Osaka"/>
+                <a:ea typeface="Osaka"/>
+                <a:cs typeface="Osaka"/>
+              </a:rPr>
+              <a:t>情報工学科教員</a:t>
+            </a:r>
+            <a:endParaRPr lang="en-US" altLang="ja-JP" sz="1200" i="1" dirty="0" smtClean="0">
+              <a:solidFill>
+                <a:srgbClr val="000000"/>
+              </a:solidFill>
+              <a:latin typeface="Osaka"/>
+              <a:ea typeface="Osaka"/>
+              <a:cs typeface="Osaka"/>
+            </a:endParaRPr>
+          </a:p>
+          <a:p>
+            <a:endParaRPr lang="en-US" altLang="ja-JP" sz="1200" dirty="0" smtClean="0">
+              <a:solidFill>
+                <a:srgbClr val="000000"/>
+              </a:solidFill>
+            </a:endParaRPr>
+          </a:p>
+          <a:p>
+            <a:r>
+              <a:rPr lang="ja-JP" altLang="en-US" sz="1200" dirty="0" smtClean="0">
+                <a:solidFill>
+                  <a:srgbClr val="000000"/>
+                </a:solidFill>
+              </a:rPr>
+              <a:t>（・人狼での振る舞いスタイル：）</a:t>
+            </a:r>
+            <a:r>
+              <a:rPr lang="ja-JP" altLang="en-US" sz="1200" i="1" dirty="0" smtClean="0">
+                <a:solidFill>
+                  <a:srgbClr val="000000"/>
+                </a:solidFill>
+                <a:latin typeface="Osaka"/>
+                <a:ea typeface="Osaka"/>
+                <a:cs typeface="Osaka"/>
+              </a:rPr>
+              <a:t>混沌度合いを高めることに執着する。</a:t>
+            </a:r>
+            <a:endParaRPr lang="en-US" altLang="ja-JP" sz="1200" i="1" dirty="0" smtClean="0">
+              <a:solidFill>
+                <a:srgbClr val="000000"/>
+              </a:solidFill>
+              <a:latin typeface="Osaka"/>
+              <a:ea typeface="Osaka"/>
+              <a:cs typeface="Osaka"/>
+            </a:endParaRPr>
+          </a:p>
+          <a:p>
+            <a:endParaRPr lang="en-US" altLang="ja-JP" sz="1200" dirty="0">
+              <a:solidFill>
+                <a:srgbClr val="000000"/>
+              </a:solidFill>
+            </a:endParaRPr>
+          </a:p>
+          <a:p>
+            <a:r>
+              <a:rPr lang="ja-JP" altLang="en-US" sz="1200" dirty="0" smtClean="0">
+                <a:solidFill>
+                  <a:srgbClr val="000000"/>
+                </a:solidFill>
+              </a:rPr>
+              <a:t>・出身地：</a:t>
+            </a:r>
+            <a:r>
+              <a:rPr lang="ja-JP" altLang="en-US" sz="1200" i="1" dirty="0" smtClean="0">
+                <a:solidFill>
+                  <a:srgbClr val="000000"/>
+                </a:solidFill>
+                <a:latin typeface="Osaka"/>
+                <a:ea typeface="Osaka"/>
+                <a:cs typeface="Osaka"/>
+              </a:rPr>
+              <a:t>沖縄</a:t>
+            </a:r>
+            <a:endParaRPr lang="en-US" altLang="ja-JP" sz="1200" i="1" dirty="0" smtClean="0">
+              <a:solidFill>
+                <a:srgbClr val="000000"/>
+              </a:solidFill>
+              <a:latin typeface="Osaka"/>
+              <a:ea typeface="Osaka"/>
+              <a:cs typeface="Osaka"/>
+            </a:endParaRPr>
+          </a:p>
+          <a:p>
+            <a:endParaRPr lang="en-US" altLang="ja-JP" sz="1200" dirty="0">
+              <a:solidFill>
+                <a:srgbClr val="000000"/>
+              </a:solidFill>
+            </a:endParaRPr>
+          </a:p>
+          <a:p>
+            <a:r>
+              <a:rPr lang="ja-JP" altLang="en-US" sz="1200" dirty="0" smtClean="0">
+                <a:solidFill>
+                  <a:srgbClr val="000000"/>
+                </a:solidFill>
+              </a:rPr>
+              <a:t>・金遣い：</a:t>
+            </a:r>
+            <a:r>
+              <a:rPr lang="ja-JP" altLang="en-US" sz="1200" i="1" dirty="0" smtClean="0">
+                <a:solidFill>
+                  <a:srgbClr val="000000"/>
+                </a:solidFill>
+                <a:latin typeface="Osaka"/>
+                <a:ea typeface="Osaka"/>
+                <a:cs typeface="Osaka"/>
+              </a:rPr>
+              <a:t>面白そうな本はどんどん買っちゃう。</a:t>
+            </a:r>
+            <a:endParaRPr lang="en-US" altLang="ja-JP" sz="1200" i="1" dirty="0" smtClean="0">
+              <a:solidFill>
+                <a:srgbClr val="000000"/>
+              </a:solidFill>
+              <a:latin typeface="Osaka"/>
+              <a:ea typeface="Osaka"/>
+              <a:cs typeface="Osaka"/>
+            </a:endParaRPr>
+          </a:p>
+          <a:p>
+            <a:endParaRPr lang="en-US" altLang="ja-JP" sz="1200" dirty="0">
+              <a:solidFill>
+                <a:srgbClr val="000000"/>
+              </a:solidFill>
+            </a:endParaRPr>
+          </a:p>
+          <a:p>
+            <a:r>
+              <a:rPr lang="ja-JP" altLang="en-US" sz="1200" dirty="0" smtClean="0">
+                <a:solidFill>
+                  <a:srgbClr val="000000"/>
+                </a:solidFill>
+              </a:rPr>
+              <a:t>・癖：</a:t>
+            </a:r>
+            <a:r>
+              <a:rPr lang="ja-JP" altLang="en-US" sz="1200" i="1" dirty="0" smtClean="0">
+                <a:solidFill>
+                  <a:srgbClr val="000000"/>
+                </a:solidFill>
+                <a:latin typeface="Osaka"/>
+                <a:ea typeface="Osaka"/>
+                <a:cs typeface="Osaka"/>
+              </a:rPr>
+              <a:t>行き当たりばったり。熱しやすく冷めやすい。ドキュメント（テキスト化）に残す。</a:t>
+            </a:r>
+            <a:endParaRPr lang="en-US" altLang="ja-JP" sz="1200" i="1" dirty="0" smtClean="0">
+              <a:solidFill>
+                <a:srgbClr val="000000"/>
+              </a:solidFill>
+              <a:latin typeface="Osaka"/>
+              <a:ea typeface="Osaka"/>
+              <a:cs typeface="Osaka"/>
+            </a:endParaRPr>
+          </a:p>
+        </p:txBody>
+      </p:sp>
+      <p:sp>
+        <p:nvSpPr>
+          <p:cNvPr id="7" name="正方形/長方形 6"/>
+          <p:cNvSpPr/>
+          <p:nvPr/>
+        </p:nvSpPr>
+        <p:spPr>
+          <a:xfrm>
+            <a:off x="3579226" y="4513943"/>
+            <a:ext cx="2870184" cy="4283691"/>
+          </a:xfrm>
+          <a:prstGeom prst="rect">
+            <a:avLst/>
+          </a:prstGeom>
+          <a:noFill/>
+          <a:ln>
+            <a:noFill/>
+          </a:ln>
+          <a:effectLst/>
+        </p:spPr>
+        <p:style>
+          <a:lnRef idx="1">
+            <a:schemeClr val="accent1"/>
+          </a:lnRef>
+          <a:fillRef idx="3">
+            <a:schemeClr val="accent1"/>
+          </a:fillRef>
+          <a:effectRef idx="2">
+            <a:schemeClr val="accent1"/>
+          </a:effectRef>
+          <a:fontRef idx="minor">
+            <a:schemeClr val="lt1"/>
+          </a:fontRef>
+        </p:style>
+        <p:txBody>
+          <a:bodyPr rtlCol="0" anchor="t" anchorCtr="0"/>
+          <a:lstStyle/>
+          <a:p>
+            <a:r>
+              <a:rPr kumimoji="1" lang="en-US" altLang="ja-JP" b="1" dirty="0" smtClean="0">
+                <a:solidFill>
+                  <a:srgbClr val="000000"/>
+                </a:solidFill>
+              </a:rPr>
+              <a:t>[ </a:t>
+            </a:r>
+            <a:r>
+              <a:rPr kumimoji="1" lang="ja-JP" altLang="en-US" b="1" dirty="0" smtClean="0">
+                <a:solidFill>
+                  <a:srgbClr val="000000"/>
+                </a:solidFill>
+              </a:rPr>
+              <a:t>ゴール（や事実談）</a:t>
+            </a:r>
+            <a:r>
+              <a:rPr kumimoji="1" lang="en-US" altLang="ja-JP" b="1" dirty="0" smtClean="0">
+                <a:solidFill>
+                  <a:srgbClr val="000000"/>
+                </a:solidFill>
+              </a:rPr>
+              <a:t>]</a:t>
+            </a:r>
+          </a:p>
+          <a:p>
+            <a:endParaRPr lang="en-US" altLang="ja-JP" sz="1200" dirty="0" smtClean="0">
+              <a:solidFill>
+                <a:srgbClr val="000000"/>
+              </a:solidFill>
+            </a:endParaRPr>
+          </a:p>
+          <a:p>
+            <a:r>
+              <a:rPr lang="ja-JP" altLang="en-US" sz="1200" dirty="0" smtClean="0">
+                <a:solidFill>
+                  <a:srgbClr val="000000"/>
+                </a:solidFill>
+              </a:rPr>
+              <a:t>・デザインスクールでの目標と、それに向けて準備してきたこと：</a:t>
+            </a:r>
+            <a:endParaRPr lang="en-US" altLang="ja-JP" dirty="0" smtClean="0">
+              <a:solidFill>
+                <a:srgbClr val="000000"/>
+              </a:solidFill>
+            </a:endParaRPr>
+          </a:p>
+          <a:p>
+            <a:r>
+              <a:rPr lang="ja-JP" altLang="en-US" sz="1000" i="1" dirty="0" smtClean="0">
+                <a:solidFill>
+                  <a:srgbClr val="000000"/>
+                </a:solidFill>
+                <a:latin typeface="Osaka"/>
+                <a:ea typeface="Osaka"/>
+                <a:cs typeface="Osaka"/>
+              </a:rPr>
+              <a:t>　</a:t>
+            </a:r>
+            <a:r>
+              <a:rPr lang="ja-JP" altLang="en-US" sz="1000" i="1" dirty="0">
+                <a:solidFill>
+                  <a:srgbClr val="000000"/>
+                </a:solidFill>
+                <a:latin typeface="Osaka"/>
+                <a:ea typeface="Osaka"/>
+                <a:cs typeface="Osaka"/>
+              </a:rPr>
+              <a:t>時空間的に密な環境を</a:t>
+            </a:r>
+            <a:r>
+              <a:rPr lang="ja-JP" altLang="en-US" sz="1000" i="1" dirty="0" smtClean="0">
+                <a:solidFill>
+                  <a:srgbClr val="000000"/>
+                </a:solidFill>
+                <a:latin typeface="Osaka"/>
+                <a:ea typeface="Osaka"/>
+                <a:cs typeface="Osaka"/>
+              </a:rPr>
+              <a:t>用意</a:t>
+            </a:r>
+            <a:r>
+              <a:rPr lang="ja-JP" altLang="en-US" sz="1000" i="1" dirty="0" smtClean="0">
+                <a:solidFill>
+                  <a:srgbClr val="000000"/>
+                </a:solidFill>
+                <a:latin typeface="Osaka"/>
+                <a:ea typeface="Osaka"/>
+                <a:cs typeface="Osaka"/>
+              </a:rPr>
+              <a:t>。他流試合形式による様々な視点＋京大生の本気度合いを「体感」させる。ファシリテーターとしては「デザイン手法」と問題の設定方法、切り口を例示することで取り組み方の勉強になることを期待。</a:t>
+            </a:r>
+            <a:endParaRPr lang="en-US" altLang="ja-JP" sz="1000" i="1" dirty="0">
+              <a:solidFill>
+                <a:srgbClr val="000000"/>
+              </a:solidFill>
+              <a:latin typeface="Osaka"/>
+              <a:ea typeface="Osaka"/>
+              <a:cs typeface="Osaka"/>
+            </a:endParaRPr>
+          </a:p>
+          <a:p>
+            <a:endParaRPr lang="en-US" altLang="ja-JP" sz="1000" dirty="0" smtClean="0">
+              <a:solidFill>
+                <a:srgbClr val="000000"/>
+              </a:solidFill>
+            </a:endParaRPr>
+          </a:p>
+          <a:p>
+            <a:r>
+              <a:rPr lang="ja-JP" altLang="en-US" sz="1200" dirty="0" smtClean="0">
+                <a:solidFill>
+                  <a:srgbClr val="000000"/>
+                </a:solidFill>
+              </a:rPr>
+              <a:t>・発言例：</a:t>
+            </a:r>
+            <a:endParaRPr lang="en-US" altLang="ja-JP" sz="1200" dirty="0">
+              <a:solidFill>
+                <a:srgbClr val="000000"/>
+              </a:solidFill>
+            </a:endParaRPr>
+          </a:p>
+          <a:p>
+            <a:r>
+              <a:rPr lang="ja-JP" altLang="en-US" sz="1000" i="1" dirty="0" smtClean="0">
+                <a:solidFill>
+                  <a:srgbClr val="000000"/>
+                </a:solidFill>
+                <a:latin typeface="Osaka"/>
+                <a:ea typeface="Osaka"/>
+                <a:cs typeface="Osaka"/>
+              </a:rPr>
+              <a:t>　</a:t>
+            </a:r>
+            <a:r>
+              <a:rPr lang="ja-JP" altLang="en-US" sz="1000" i="1" dirty="0">
+                <a:solidFill>
+                  <a:srgbClr val="000000"/>
+                </a:solidFill>
+                <a:latin typeface="Osaka"/>
+                <a:ea typeface="Osaka"/>
+                <a:cs typeface="Osaka"/>
+              </a:rPr>
+              <a:t>経験知の言語化を</a:t>
+            </a:r>
+            <a:r>
+              <a:rPr lang="ja-JP" altLang="en-US" sz="1000" i="1" dirty="0" smtClean="0">
+                <a:solidFill>
+                  <a:srgbClr val="000000"/>
+                </a:solidFill>
+                <a:latin typeface="Osaka"/>
+                <a:ea typeface="Osaka"/>
+                <a:cs typeface="Osaka"/>
+              </a:rPr>
+              <a:t>促す</a:t>
+            </a:r>
+            <a:r>
+              <a:rPr lang="ja-JP" altLang="en-US" sz="1000" i="1" dirty="0" smtClean="0">
+                <a:solidFill>
+                  <a:srgbClr val="000000"/>
+                </a:solidFill>
+                <a:latin typeface="Osaka"/>
+                <a:ea typeface="Osaka"/>
+                <a:cs typeface="Osaka"/>
+              </a:rPr>
+              <a:t>ため、</a:t>
+            </a:r>
+            <a:r>
+              <a:rPr lang="ja-JP" altLang="en-US" sz="1000" i="1" dirty="0" smtClean="0">
+                <a:solidFill>
+                  <a:srgbClr val="000000"/>
+                </a:solidFill>
+                <a:latin typeface="Osaka"/>
+                <a:ea typeface="Osaka"/>
+                <a:cs typeface="Osaka"/>
+              </a:rPr>
+              <a:t>発言</a:t>
+            </a:r>
+            <a:r>
+              <a:rPr lang="ja-JP" altLang="en-US" sz="1000" i="1" dirty="0">
+                <a:solidFill>
+                  <a:srgbClr val="000000"/>
+                </a:solidFill>
+                <a:latin typeface="Osaka"/>
+                <a:ea typeface="Osaka"/>
+                <a:cs typeface="Osaka"/>
+              </a:rPr>
+              <a:t>意図を確認することと、参加者全員の共通言語と</a:t>
+            </a:r>
+            <a:r>
+              <a:rPr lang="ja-JP" altLang="en-US" sz="1000" i="1" dirty="0" smtClean="0">
+                <a:solidFill>
+                  <a:srgbClr val="000000"/>
+                </a:solidFill>
+                <a:latin typeface="Osaka"/>
+                <a:ea typeface="Osaka"/>
+                <a:cs typeface="Osaka"/>
+              </a:rPr>
+              <a:t>なること</a:t>
+            </a:r>
+            <a:r>
+              <a:rPr lang="ja-JP" altLang="en-US" sz="1000" i="1" dirty="0">
+                <a:solidFill>
+                  <a:srgbClr val="000000"/>
+                </a:solidFill>
+                <a:latin typeface="Osaka"/>
+                <a:ea typeface="Osaka"/>
+                <a:cs typeface="Osaka"/>
+              </a:rPr>
+              <a:t>を目的と</a:t>
+            </a:r>
+            <a:r>
+              <a:rPr lang="ja-JP" altLang="en-US" sz="1000" i="1" dirty="0" smtClean="0">
+                <a:solidFill>
+                  <a:srgbClr val="000000"/>
+                </a:solidFill>
+                <a:latin typeface="Osaka"/>
+                <a:ea typeface="Osaka"/>
+                <a:cs typeface="Osaka"/>
+              </a:rPr>
+              <a:t>して</a:t>
+            </a:r>
+            <a:r>
+              <a:rPr lang="ja-JP" altLang="en-US" sz="1000" i="1" dirty="0" smtClean="0">
+                <a:solidFill>
+                  <a:srgbClr val="000000"/>
+                </a:solidFill>
+                <a:latin typeface="Osaka"/>
+                <a:ea typeface="Osaka"/>
+                <a:cs typeface="Osaka"/>
+              </a:rPr>
+              <a:t>　「具体的にそれどういうこと？」、「例えば？」、「どいうところが良かった？」と具体的に体験をした場面を話してもらうことを期待。</a:t>
+            </a:r>
+            <a:endParaRPr lang="en-US" altLang="ja-JP" sz="1000" i="1" dirty="0">
+              <a:solidFill>
+                <a:srgbClr val="000000"/>
+              </a:solidFill>
+              <a:latin typeface="Osaka"/>
+              <a:ea typeface="Osaka"/>
+              <a:cs typeface="Osaka"/>
+            </a:endParaRPr>
+          </a:p>
+          <a:p>
+            <a:endParaRPr lang="en-US" altLang="ja-JP" sz="1200" dirty="0">
+              <a:solidFill>
+                <a:srgbClr val="000000"/>
+              </a:solidFill>
+            </a:endParaRPr>
+          </a:p>
+          <a:p>
+            <a:r>
+              <a:rPr lang="ja-JP" altLang="en-US" sz="1200" dirty="0" smtClean="0">
+                <a:solidFill>
+                  <a:srgbClr val="000000"/>
+                </a:solidFill>
+              </a:rPr>
+              <a:t>・行動例：</a:t>
+            </a:r>
+            <a:endParaRPr lang="en-US" altLang="ja-JP" sz="1200" dirty="0" smtClean="0">
+              <a:solidFill>
+                <a:srgbClr val="000000"/>
+              </a:solidFill>
+            </a:endParaRPr>
+          </a:p>
+          <a:p>
+            <a:r>
+              <a:rPr lang="ja-JP" altLang="en-US" sz="1000" i="1" dirty="0" smtClean="0">
+                <a:solidFill>
+                  <a:srgbClr val="000000"/>
+                </a:solidFill>
+                <a:latin typeface="Osaka"/>
+                <a:ea typeface="Osaka"/>
+                <a:cs typeface="Osaka"/>
+              </a:rPr>
+              <a:t>　自由討論時には発言権（発言回数）をなるべく平等にするため、発言順番を決める。アイデア出し時にはできるだけ批判はしない（確認はしちゃう）。発散させるのが好み。収束させるフェーズでは個別対応で済ますとか。</a:t>
+            </a:r>
+            <a:endParaRPr lang="en-US" altLang="ja-JP" sz="1000" i="1" dirty="0" smtClean="0">
+              <a:solidFill>
+                <a:srgbClr val="000000"/>
+              </a:solidFill>
+              <a:latin typeface="Osaka"/>
+              <a:ea typeface="Osaka"/>
+              <a:cs typeface="Osaka"/>
+            </a:endParaRPr>
+          </a:p>
+          <a:p>
+            <a:endParaRPr lang="en-US" altLang="ja-JP" sz="1200" dirty="0">
+              <a:solidFill>
+                <a:srgbClr val="000000"/>
+              </a:solidFill>
+            </a:endParaRPr>
+          </a:p>
+          <a:p>
+            <a:r>
+              <a:rPr lang="ja-JP" altLang="en-US" sz="1200" dirty="0" smtClean="0">
+                <a:solidFill>
+                  <a:srgbClr val="000000"/>
+                </a:solidFill>
+              </a:rPr>
+              <a:t>（・反省点</a:t>
+            </a:r>
+            <a:r>
+              <a:rPr lang="en-US" altLang="ja-JP" sz="1200" dirty="0" smtClean="0">
+                <a:solidFill>
+                  <a:srgbClr val="000000"/>
+                </a:solidFill>
+              </a:rPr>
+              <a:t>:)</a:t>
+            </a:r>
+          </a:p>
+          <a:p>
+            <a:r>
+              <a:rPr lang="ja-JP" altLang="en-US" sz="1000" i="1" dirty="0" smtClean="0">
+                <a:solidFill>
+                  <a:srgbClr val="000000"/>
+                </a:solidFill>
+                <a:latin typeface="Osaka"/>
+                <a:ea typeface="Osaka"/>
+                <a:cs typeface="Osaka"/>
+              </a:rPr>
+              <a:t>　グループワークでの収束フェーズが大の苦手。行き当たりばったりが多い。</a:t>
+            </a:r>
+            <a:endParaRPr lang="en-US" altLang="ja-JP" sz="1000" i="1" dirty="0" smtClean="0">
+              <a:solidFill>
+                <a:srgbClr val="000000"/>
+              </a:solidFill>
+              <a:latin typeface="Osaka"/>
+              <a:ea typeface="Osaka"/>
+              <a:cs typeface="Osaka"/>
+            </a:endParaRPr>
+          </a:p>
+        </p:txBody>
+      </p:sp>
+    </p:spTree>
+    <p:extLst>
+      <p:ext uri="{BB962C8B-B14F-4D97-AF65-F5344CB8AC3E}">
+        <p14:creationId xmlns:p14="http://schemas.microsoft.com/office/powerpoint/2010/main" val="680214211"/>
       </p:ext>
     </p:extLst>
   </p:cSld>

</xml_diff>